<commit_message>
Add info about coffebreak and lunch
</commit_message>
<xml_diff>
--- a/dotnetconf/Technical/Decks/Jose_Azure/5 Azure Services Every .NET Developer Needs to Know.pptx
+++ b/dotnetconf/Technical/Decks/Jose_Azure/5 Azure Services Every .NET Developer Needs to Know.pptx
@@ -6,27 +6,28 @@
     <p:sldMasterId id="2147483660" r:id="rId2"/>
   </p:sldMasterIdLst>
   <p:notesMasterIdLst>
-    <p:notesMasterId r:id="rId21"/>
+    <p:notesMasterId r:id="rId22"/>
   </p:notesMasterIdLst>
   <p:sldIdLst>
     <p:sldId id="256" r:id="rId3"/>
     <p:sldId id="257" r:id="rId4"/>
     <p:sldId id="1828" r:id="rId5"/>
-    <p:sldId id="1832" r:id="rId6"/>
-    <p:sldId id="1825" r:id="rId7"/>
-    <p:sldId id="263" r:id="rId8"/>
-    <p:sldId id="261" r:id="rId9"/>
-    <p:sldId id="1816" r:id="rId10"/>
-    <p:sldId id="1821" r:id="rId11"/>
-    <p:sldId id="1834" r:id="rId12"/>
-    <p:sldId id="1820" r:id="rId13"/>
-    <p:sldId id="1817" r:id="rId14"/>
-    <p:sldId id="1835" r:id="rId15"/>
-    <p:sldId id="1819" r:id="rId16"/>
-    <p:sldId id="1824" r:id="rId17"/>
-    <p:sldId id="1826" r:id="rId18"/>
-    <p:sldId id="1823" r:id="rId19"/>
-    <p:sldId id="1833" r:id="rId20"/>
+    <p:sldId id="1836" r:id="rId6"/>
+    <p:sldId id="1832" r:id="rId7"/>
+    <p:sldId id="1825" r:id="rId8"/>
+    <p:sldId id="263" r:id="rId9"/>
+    <p:sldId id="261" r:id="rId10"/>
+    <p:sldId id="1816" r:id="rId11"/>
+    <p:sldId id="1821" r:id="rId12"/>
+    <p:sldId id="1834" r:id="rId13"/>
+    <p:sldId id="1820" r:id="rId14"/>
+    <p:sldId id="1817" r:id="rId15"/>
+    <p:sldId id="1835" r:id="rId16"/>
+    <p:sldId id="1819" r:id="rId17"/>
+    <p:sldId id="1824" r:id="rId18"/>
+    <p:sldId id="1826" r:id="rId19"/>
+    <p:sldId id="1823" r:id="rId20"/>
+    <p:sldId id="1833" r:id="rId21"/>
   </p:sldIdLst>
   <p:sldSz cx="12192000" cy="6858000"/>
   <p:notesSz cx="6858000" cy="9144000"/>
@@ -398,7 +399,7 @@
           <a:p>
             <a:fld id="{5006B1E6-C217-4B17-BDA1-F8F4E8C94040}" type="datetimeFigureOut">
               <a:rPr lang="en-US" smtClean="0"/>
-              <a:t>9/12/2018</a:t>
+              <a:t>10/25/2018</a:t>
             </a:fld>
             <a:endParaRPr lang="en-US"/>
           </a:p>
@@ -1065,7 +1066,7 @@
                 <a:tabLst/>
                 <a:defRPr/>
               </a:pPr>
-              <a:t>6</a:t>
+              <a:t>7</a:t>
             </a:fld>
             <a:endParaRPr kumimoji="0" lang="en-US" sz="1200" b="0" i="0" u="none" strike="noStrike" kern="1200" cap="none" spc="0" normalizeH="0" baseline="0" noProof="0">
               <a:ln>
@@ -1209,7 +1210,7 @@
                 <a:tabLst/>
                 <a:defRPr/>
               </a:pPr>
-              <a:t>7</a:t>
+              <a:t>8</a:t>
             </a:fld>
             <a:endParaRPr kumimoji="0" lang="en-US" sz="1200" b="0" i="0" u="none" strike="noStrike" kern="1200" cap="none" spc="0" normalizeH="0" baseline="0" noProof="0">
               <a:ln>
@@ -1353,7 +1354,7 @@
                 <a:tabLst/>
                 <a:defRPr/>
               </a:pPr>
-              <a:t>10</a:t>
+              <a:t>11</a:t>
             </a:fld>
             <a:endParaRPr kumimoji="0" lang="en-US" sz="1200" b="0" i="0" u="none" strike="noStrike" kern="1200" cap="none" spc="0" normalizeH="0" baseline="0" noProof="0">
               <a:ln>
@@ -1497,7 +1498,7 @@
                 <a:tabLst/>
                 <a:defRPr/>
               </a:pPr>
-              <a:t>13</a:t>
+              <a:t>14</a:t>
             </a:fld>
             <a:endParaRPr kumimoji="0" lang="en-US" sz="1200" b="0" i="0" u="none" strike="noStrike" kern="1200" cap="none" spc="0" normalizeH="0" baseline="0" noProof="0">
               <a:ln>
@@ -1676,7 +1677,7 @@
           <a:p>
             <a:fld id="{E3BF5DFB-7C42-4F32-9D30-296EFBC4A856}" type="datetimeFigureOut">
               <a:rPr lang="en-US" smtClean="0"/>
-              <a:t>9/12/2018</a:t>
+              <a:t>10/25/2018</a:t>
             </a:fld>
             <a:endParaRPr lang="en-US"/>
           </a:p>
@@ -1874,7 +1875,7 @@
           <a:p>
             <a:fld id="{E3BF5DFB-7C42-4F32-9D30-296EFBC4A856}" type="datetimeFigureOut">
               <a:rPr lang="en-US" smtClean="0"/>
-              <a:t>9/12/2018</a:t>
+              <a:t>10/25/2018</a:t>
             </a:fld>
             <a:endParaRPr lang="en-US"/>
           </a:p>
@@ -2082,7 +2083,7 @@
           <a:p>
             <a:fld id="{E3BF5DFB-7C42-4F32-9D30-296EFBC4A856}" type="datetimeFigureOut">
               <a:rPr lang="en-US" smtClean="0"/>
-              <a:t>9/12/2018</a:t>
+              <a:t>10/25/2018</a:t>
             </a:fld>
             <a:endParaRPr lang="en-US"/>
           </a:p>
@@ -4524,7 +4525,7 @@
           <a:p>
             <a:fld id="{E3BF5DFB-7C42-4F32-9D30-296EFBC4A856}" type="datetimeFigureOut">
               <a:rPr lang="en-US" smtClean="0"/>
-              <a:t>9/12/2018</a:t>
+              <a:t>10/25/2018</a:t>
             </a:fld>
             <a:endParaRPr lang="en-US"/>
           </a:p>
@@ -6569,7 +6570,7 @@
           <a:p>
             <a:fld id="{E3BF5DFB-7C42-4F32-9D30-296EFBC4A856}" type="datetimeFigureOut">
               <a:rPr lang="en-US" smtClean="0"/>
-              <a:t>9/12/2018</a:t>
+              <a:t>10/25/2018</a:t>
             </a:fld>
             <a:endParaRPr lang="en-US"/>
           </a:p>
@@ -6834,7 +6835,7 @@
           <a:p>
             <a:fld id="{E3BF5DFB-7C42-4F32-9D30-296EFBC4A856}" type="datetimeFigureOut">
               <a:rPr lang="en-US" smtClean="0"/>
-              <a:t>9/12/2018</a:t>
+              <a:t>10/25/2018</a:t>
             </a:fld>
             <a:endParaRPr lang="en-US"/>
           </a:p>
@@ -7246,7 +7247,7 @@
           <a:p>
             <a:fld id="{E3BF5DFB-7C42-4F32-9D30-296EFBC4A856}" type="datetimeFigureOut">
               <a:rPr lang="en-US" smtClean="0"/>
-              <a:t>9/12/2018</a:t>
+              <a:t>10/25/2018</a:t>
             </a:fld>
             <a:endParaRPr lang="en-US"/>
           </a:p>
@@ -7387,7 +7388,7 @@
           <a:p>
             <a:fld id="{E3BF5DFB-7C42-4F32-9D30-296EFBC4A856}" type="datetimeFigureOut">
               <a:rPr lang="en-US" smtClean="0"/>
-              <a:t>9/12/2018</a:t>
+              <a:t>10/25/2018</a:t>
             </a:fld>
             <a:endParaRPr lang="en-US"/>
           </a:p>
@@ -7500,7 +7501,7 @@
           <a:p>
             <a:fld id="{E3BF5DFB-7C42-4F32-9D30-296EFBC4A856}" type="datetimeFigureOut">
               <a:rPr lang="en-US" smtClean="0"/>
-              <a:t>9/12/2018</a:t>
+              <a:t>10/25/2018</a:t>
             </a:fld>
             <a:endParaRPr lang="en-US"/>
           </a:p>
@@ -7811,7 +7812,7 @@
           <a:p>
             <a:fld id="{E3BF5DFB-7C42-4F32-9D30-296EFBC4A856}" type="datetimeFigureOut">
               <a:rPr lang="en-US" smtClean="0"/>
-              <a:t>9/12/2018</a:t>
+              <a:t>10/25/2018</a:t>
             </a:fld>
             <a:endParaRPr lang="en-US"/>
           </a:p>
@@ -8099,7 +8100,7 @@
           <a:p>
             <a:fld id="{E3BF5DFB-7C42-4F32-9D30-296EFBC4A856}" type="datetimeFigureOut">
               <a:rPr lang="en-US" smtClean="0"/>
-              <a:t>9/12/2018</a:t>
+              <a:t>10/25/2018</a:t>
             </a:fld>
             <a:endParaRPr lang="en-US"/>
           </a:p>
@@ -8340,7 +8341,7 @@
           <a:p>
             <a:fld id="{E3BF5DFB-7C42-4F32-9D30-296EFBC4A856}" type="datetimeFigureOut">
               <a:rPr lang="en-US" smtClean="0"/>
-              <a:t>9/12/2018</a:t>
+              <a:t>10/25/2018</a:t>
             </a:fld>
             <a:endParaRPr lang="en-US"/>
           </a:p>
@@ -11004,6 +11005,378 @@
           <p:cNvPr id="2" name="Title 1">
             <a:extLst>
               <a:ext uri="{FF2B5EF4-FFF2-40B4-BE49-F238E27FC236}">
+                <a16:creationId xmlns:a16="http://schemas.microsoft.com/office/drawing/2014/main" id="{1ED63F98-95E6-4879-8713-FDAE1CF8B348}"/>
+              </a:ext>
+            </a:extLst>
+          </p:cNvPr>
+          <p:cNvSpPr>
+            <a:spLocks noGrp="1"/>
+          </p:cNvSpPr>
+          <p:nvPr>
+            <p:ph type="title"/>
+          </p:nvPr>
+        </p:nvSpPr>
+        <p:spPr/>
+        <p:txBody>
+          <a:bodyPr/>
+          <a:lstStyle/>
+          <a:p>
+            <a:r>
+              <a:rPr lang="en-US" dirty="0"/>
+              <a:t>#2 SQL Database</a:t>
+            </a:r>
+          </a:p>
+        </p:txBody>
+      </p:sp>
+      <p:sp>
+        <p:nvSpPr>
+          <p:cNvPr id="3" name="Text Placeholder 2">
+            <a:extLst>
+              <a:ext uri="{FF2B5EF4-FFF2-40B4-BE49-F238E27FC236}">
+                <a16:creationId xmlns:a16="http://schemas.microsoft.com/office/drawing/2014/main" id="{593F4C24-F7F9-4FF1-9A5C-8DC692A69D8E}"/>
+              </a:ext>
+            </a:extLst>
+          </p:cNvPr>
+          <p:cNvSpPr>
+            <a:spLocks noGrp="1"/>
+          </p:cNvSpPr>
+          <p:nvPr>
+            <p:ph type="body" sz="quarter" idx="10"/>
+          </p:nvPr>
+        </p:nvSpPr>
+        <p:spPr>
+          <a:xfrm>
+            <a:off x="586389" y="1434370"/>
+            <a:ext cx="11166803" cy="2794611"/>
+          </a:xfrm>
+        </p:spPr>
+        <p:txBody>
+          <a:bodyPr/>
+          <a:lstStyle/>
+          <a:p>
+            <a:r>
+              <a:rPr lang="en-US" sz="3200" dirty="0">
+                <a:latin typeface="Segoe UI Semilight" panose="020B0402040204020203" pitchFamily="34" charset="0"/>
+                <a:cs typeface="Segoe UI Semilight" panose="020B0402040204020203" pitchFamily="34" charset="0"/>
+              </a:rPr>
+              <a:t>Built from the same code as SQL Server</a:t>
+            </a:r>
+          </a:p>
+          <a:p>
+            <a:r>
+              <a:rPr lang="en-US" sz="3200" dirty="0">
+                <a:latin typeface="Segoe UI Semilight" panose="020B0402040204020203" pitchFamily="34" charset="0"/>
+                <a:cs typeface="Segoe UI Semilight" panose="020B0402040204020203" pitchFamily="34" charset="0"/>
+              </a:rPr>
+              <a:t>	Updates available in Azure before SQL Server</a:t>
+            </a:r>
+          </a:p>
+          <a:p>
+            <a:r>
+              <a:rPr lang="en-US" sz="3200" dirty="0">
+                <a:latin typeface="Segoe UI Semilight" panose="020B0402040204020203" pitchFamily="34" charset="0"/>
+                <a:cs typeface="Segoe UI Semilight" panose="020B0402040204020203" pitchFamily="34" charset="0"/>
+              </a:rPr>
+              <a:t>Managed: Automatic patching, high availability, and scalability</a:t>
+            </a:r>
+          </a:p>
+          <a:p>
+            <a:r>
+              <a:rPr lang="en-US" sz="3200" dirty="0">
+                <a:latin typeface="Segoe UI Semilight" panose="020B0402040204020203" pitchFamily="34" charset="0"/>
+                <a:cs typeface="Segoe UI Semilight" panose="020B0402040204020203" pitchFamily="34" charset="0"/>
+              </a:rPr>
+              <a:t>Extensive monitoring and alerting capabilities</a:t>
+            </a:r>
+          </a:p>
+          <a:p>
+            <a:r>
+              <a:rPr lang="en-US" sz="3200" dirty="0">
+                <a:latin typeface="Segoe UI Semilight" panose="020B0402040204020203" pitchFamily="34" charset="0"/>
+                <a:cs typeface="Segoe UI Semilight" panose="020B0402040204020203" pitchFamily="34" charset="0"/>
+              </a:rPr>
+              <a:t>Integration with Visual Studio</a:t>
+            </a:r>
+          </a:p>
+        </p:txBody>
+      </p:sp>
+    </p:spTree>
+    <p:extLst>
+      <p:ext uri="{BB962C8B-B14F-4D97-AF65-F5344CB8AC3E}">
+        <p14:creationId xmlns:p14="http://schemas.microsoft.com/office/powerpoint/2010/main" val="1313076577"/>
+      </p:ext>
+    </p:extLst>
+  </p:cSld>
+  <p:clrMapOvr>
+    <a:masterClrMapping/>
+  </p:clrMapOvr>
+  <p:transition>
+    <p:fade/>
+  </p:transition>
+  <p:timing>
+    <p:tnLst>
+      <p:par>
+        <p:cTn id="1" dur="indefinite" restart="never" nodeType="tmRoot">
+          <p:childTnLst>
+            <p:seq concurrent="1" nextAc="seek">
+              <p:cTn id="2" dur="indefinite" nodeType="mainSeq">
+                <p:childTnLst>
+                  <p:par>
+                    <p:cTn id="3" fill="hold">
+                      <p:stCondLst>
+                        <p:cond delay="indefinite"/>
+                      </p:stCondLst>
+                      <p:childTnLst>
+                        <p:par>
+                          <p:cTn id="4" fill="hold">
+                            <p:stCondLst>
+                              <p:cond delay="0"/>
+                            </p:stCondLst>
+                            <p:childTnLst>
+                              <p:par>
+                                <p:cTn id="5" presetID="1" presetClass="entr" presetSubtype="0" fill="hold" nodeType="clickEffect">
+                                  <p:stCondLst>
+                                    <p:cond delay="0"/>
+                                  </p:stCondLst>
+                                  <p:childTnLst>
+                                    <p:set>
+                                      <p:cBhvr>
+                                        <p:cTn id="6" dur="1" fill="hold">
+                                          <p:stCondLst>
+                                            <p:cond delay="0"/>
+                                          </p:stCondLst>
+                                        </p:cTn>
+                                        <p:tgtEl>
+                                          <p:spTgt spid="3">
+                                            <p:txEl>
+                                              <p:pRg st="0" end="0"/>
+                                            </p:txEl>
+                                          </p:spTgt>
+                                        </p:tgtEl>
+                                        <p:attrNameLst>
+                                          <p:attrName>style.visibility</p:attrName>
+                                        </p:attrNameLst>
+                                      </p:cBhvr>
+                                      <p:to>
+                                        <p:strVal val="visible"/>
+                                      </p:to>
+                                    </p:set>
+                                  </p:childTnLst>
+                                </p:cTn>
+                              </p:par>
+                            </p:childTnLst>
+                          </p:cTn>
+                        </p:par>
+                        <p:par>
+                          <p:cTn id="7" fill="hold">
+                            <p:stCondLst>
+                              <p:cond delay="0"/>
+                            </p:stCondLst>
+                            <p:childTnLst>
+                              <p:par>
+                                <p:cTn id="8" presetID="1" presetClass="entr" presetSubtype="0" fill="hold" nodeType="afterEffect">
+                                  <p:stCondLst>
+                                    <p:cond delay="500"/>
+                                  </p:stCondLst>
+                                  <p:childTnLst>
+                                    <p:set>
+                                      <p:cBhvr>
+                                        <p:cTn id="9" dur="1" fill="hold">
+                                          <p:stCondLst>
+                                            <p:cond delay="0"/>
+                                          </p:stCondLst>
+                                        </p:cTn>
+                                        <p:tgtEl>
+                                          <p:spTgt spid="3">
+                                            <p:txEl>
+                                              <p:pRg st="1" end="1"/>
+                                            </p:txEl>
+                                          </p:spTgt>
+                                        </p:tgtEl>
+                                        <p:attrNameLst>
+                                          <p:attrName>style.visibility</p:attrName>
+                                        </p:attrNameLst>
+                                      </p:cBhvr>
+                                      <p:to>
+                                        <p:strVal val="visible"/>
+                                      </p:to>
+                                    </p:set>
+                                  </p:childTnLst>
+                                </p:cTn>
+                              </p:par>
+                            </p:childTnLst>
+                          </p:cTn>
+                        </p:par>
+                        <p:par>
+                          <p:cTn id="10" fill="hold">
+                            <p:stCondLst>
+                              <p:cond delay="500"/>
+                            </p:stCondLst>
+                            <p:childTnLst>
+                              <p:par>
+                                <p:cTn id="11" presetID="1" presetClass="entr" presetSubtype="0" fill="hold" nodeType="afterEffect">
+                                  <p:stCondLst>
+                                    <p:cond delay="500"/>
+                                  </p:stCondLst>
+                                  <p:childTnLst>
+                                    <p:set>
+                                      <p:cBhvr>
+                                        <p:cTn id="12" dur="1" fill="hold">
+                                          <p:stCondLst>
+                                            <p:cond delay="0"/>
+                                          </p:stCondLst>
+                                        </p:cTn>
+                                        <p:tgtEl>
+                                          <p:spTgt spid="3">
+                                            <p:txEl>
+                                              <p:pRg st="2" end="2"/>
+                                            </p:txEl>
+                                          </p:spTgt>
+                                        </p:tgtEl>
+                                        <p:attrNameLst>
+                                          <p:attrName>style.visibility</p:attrName>
+                                        </p:attrNameLst>
+                                      </p:cBhvr>
+                                      <p:to>
+                                        <p:strVal val="visible"/>
+                                      </p:to>
+                                    </p:set>
+                                  </p:childTnLst>
+                                </p:cTn>
+                              </p:par>
+                            </p:childTnLst>
+                          </p:cTn>
+                        </p:par>
+                        <p:par>
+                          <p:cTn id="13" fill="hold">
+                            <p:stCondLst>
+                              <p:cond delay="1000"/>
+                            </p:stCondLst>
+                            <p:childTnLst>
+                              <p:par>
+                                <p:cTn id="14" presetID="1" presetClass="entr" presetSubtype="0" fill="hold" nodeType="afterEffect">
+                                  <p:stCondLst>
+                                    <p:cond delay="500"/>
+                                  </p:stCondLst>
+                                  <p:childTnLst>
+                                    <p:set>
+                                      <p:cBhvr>
+                                        <p:cTn id="15" dur="1" fill="hold">
+                                          <p:stCondLst>
+                                            <p:cond delay="0"/>
+                                          </p:stCondLst>
+                                        </p:cTn>
+                                        <p:tgtEl>
+                                          <p:spTgt spid="3">
+                                            <p:txEl>
+                                              <p:pRg st="3" end="3"/>
+                                            </p:txEl>
+                                          </p:spTgt>
+                                        </p:tgtEl>
+                                        <p:attrNameLst>
+                                          <p:attrName>style.visibility</p:attrName>
+                                        </p:attrNameLst>
+                                      </p:cBhvr>
+                                      <p:to>
+                                        <p:strVal val="visible"/>
+                                      </p:to>
+                                    </p:set>
+                                  </p:childTnLst>
+                                </p:cTn>
+                              </p:par>
+                            </p:childTnLst>
+                          </p:cTn>
+                        </p:par>
+                        <p:par>
+                          <p:cTn id="16" fill="hold">
+                            <p:stCondLst>
+                              <p:cond delay="1500"/>
+                            </p:stCondLst>
+                            <p:childTnLst>
+                              <p:par>
+                                <p:cTn id="17" presetID="1" presetClass="entr" presetSubtype="0" fill="hold" nodeType="afterEffect">
+                                  <p:stCondLst>
+                                    <p:cond delay="500"/>
+                                  </p:stCondLst>
+                                  <p:childTnLst>
+                                    <p:set>
+                                      <p:cBhvr>
+                                        <p:cTn id="18" dur="1" fill="hold">
+                                          <p:stCondLst>
+                                            <p:cond delay="0"/>
+                                          </p:stCondLst>
+                                        </p:cTn>
+                                        <p:tgtEl>
+                                          <p:spTgt spid="3">
+                                            <p:txEl>
+                                              <p:pRg st="4" end="4"/>
+                                            </p:txEl>
+                                          </p:spTgt>
+                                        </p:tgtEl>
+                                        <p:attrNameLst>
+                                          <p:attrName>style.visibility</p:attrName>
+                                        </p:attrNameLst>
+                                      </p:cBhvr>
+                                      <p:to>
+                                        <p:strVal val="visible"/>
+                                      </p:to>
+                                    </p:set>
+                                  </p:childTnLst>
+                                </p:cTn>
+                              </p:par>
+                            </p:childTnLst>
+                          </p:cTn>
+                        </p:par>
+                      </p:childTnLst>
+                    </p:cTn>
+                  </p:par>
+                </p:childTnLst>
+              </p:cTn>
+              <p:prevCondLst>
+                <p:cond evt="onPrev" delay="0">
+                  <p:tgtEl>
+                    <p:sldTgt/>
+                  </p:tgtEl>
+                </p:cond>
+              </p:prevCondLst>
+              <p:nextCondLst>
+                <p:cond evt="onNext" delay="0">
+                  <p:tgtEl>
+                    <p:sldTgt/>
+                  </p:tgtEl>
+                </p:cond>
+              </p:nextCondLst>
+            </p:seq>
+          </p:childTnLst>
+        </p:cTn>
+      </p:par>
+    </p:tnLst>
+  </p:timing>
+</p:sld>
+</file>
+
+<file path=ppt/slides/slide11.xml><?xml version="1.0" encoding="utf-8"?>
+<p:sld xmlns:a="http://schemas.openxmlformats.org/drawingml/2006/main" xmlns:r="http://schemas.openxmlformats.org/officeDocument/2006/relationships" xmlns:p="http://schemas.openxmlformats.org/presentationml/2006/main">
+  <p:cSld>
+    <p:spTree>
+      <p:nvGrpSpPr>
+        <p:cNvPr id="1" name=""/>
+        <p:cNvGrpSpPr/>
+        <p:nvPr/>
+      </p:nvGrpSpPr>
+      <p:grpSpPr>
+        <a:xfrm>
+          <a:off x="0" y="0"/>
+          <a:ext cx="0" cy="0"/>
+          <a:chOff x="0" y="0"/>
+          <a:chExt cx="0" cy="0"/>
+        </a:xfrm>
+      </p:grpSpPr>
+      <p:sp>
+        <p:nvSpPr>
+          <p:cNvPr id="2" name="Title 1">
+            <a:extLst>
+              <a:ext uri="{FF2B5EF4-FFF2-40B4-BE49-F238E27FC236}">
                 <a16:creationId xmlns:a16="http://schemas.microsoft.com/office/drawing/2014/main" id="{89E36756-4ECC-4563-9847-79578B809B5C}"/>
               </a:ext>
             </a:extLst>
@@ -11064,7 +11437,7 @@
 </p:sld>
 </file>
 
-<file path=ppt/slides/slide11.xml><?xml version="1.0" encoding="utf-8"?>
+<file path=ppt/slides/slide12.xml><?xml version="1.0" encoding="utf-8"?>
 <p:sld xmlns:a="http://schemas.openxmlformats.org/drawingml/2006/main" xmlns:r="http://schemas.openxmlformats.org/officeDocument/2006/relationships" xmlns:p="http://schemas.openxmlformats.org/presentationml/2006/main">
   <p:cSld>
     <p:spTree>
@@ -11606,7 +11979,7 @@
 </p:sld>
 </file>
 
-<file path=ppt/slides/slide12.xml><?xml version="1.0" encoding="utf-8"?>
+<file path=ppt/slides/slide13.xml><?xml version="1.0" encoding="utf-8"?>
 <p:sld xmlns:a="http://schemas.openxmlformats.org/drawingml/2006/main" xmlns:r="http://schemas.openxmlformats.org/officeDocument/2006/relationships" xmlns:p="http://schemas.openxmlformats.org/presentationml/2006/main">
   <p:cSld>
     <p:spTree>
@@ -12094,7 +12467,7 @@
 </p:sld>
 </file>
 
-<file path=ppt/slides/slide13.xml><?xml version="1.0" encoding="utf-8"?>
+<file path=ppt/slides/slide14.xml><?xml version="1.0" encoding="utf-8"?>
 <p:sld xmlns:a="http://schemas.openxmlformats.org/drawingml/2006/main" xmlns:r="http://schemas.openxmlformats.org/officeDocument/2006/relationships" xmlns:p="http://schemas.openxmlformats.org/presentationml/2006/main">
   <p:cSld>
     <p:spTree>
@@ -12176,7 +12549,7 @@
 </p:sld>
 </file>
 
-<file path=ppt/slides/slide14.xml><?xml version="1.0" encoding="utf-8"?>
+<file path=ppt/slides/slide15.xml><?xml version="1.0" encoding="utf-8"?>
 <p:sld xmlns:a="http://schemas.openxmlformats.org/drawingml/2006/main" xmlns:r="http://schemas.openxmlformats.org/officeDocument/2006/relationships" xmlns:p="http://schemas.openxmlformats.org/presentationml/2006/main">
   <p:cSld>
     <p:spTree>
@@ -12597,7 +12970,7 @@
 </p:sld>
 </file>
 
-<file path=ppt/slides/slide15.xml><?xml version="1.0" encoding="utf-8"?>
+<file path=ppt/slides/slide16.xml><?xml version="1.0" encoding="utf-8"?>
 <p:sld xmlns:a="http://schemas.openxmlformats.org/drawingml/2006/main" xmlns:r="http://schemas.openxmlformats.org/officeDocument/2006/relationships" xmlns:p="http://schemas.openxmlformats.org/presentationml/2006/main">
   <p:cSld>
     <p:spTree>
@@ -12825,7 +13198,7 @@
 </p:sld>
 </file>
 
-<file path=ppt/slides/slide16.xml><?xml version="1.0" encoding="utf-8"?>
+<file path=ppt/slides/slide17.xml><?xml version="1.0" encoding="utf-8"?>
 <p:sld xmlns:a="http://schemas.openxmlformats.org/drawingml/2006/main" xmlns:r="http://schemas.openxmlformats.org/officeDocument/2006/relationships" xmlns:p="http://schemas.openxmlformats.org/presentationml/2006/main">
   <p:cSld>
     <p:spTree>
@@ -12937,7 +13310,7 @@
 </p:sld>
 </file>
 
-<file path=ppt/slides/slide17.xml><?xml version="1.0" encoding="utf-8"?>
+<file path=ppt/slides/slide18.xml><?xml version="1.0" encoding="utf-8"?>
 <p:sld xmlns:a="http://schemas.openxmlformats.org/drawingml/2006/main" xmlns:r="http://schemas.openxmlformats.org/officeDocument/2006/relationships" xmlns:p="http://schemas.openxmlformats.org/presentationml/2006/main">
   <p:cSld>
     <p:spTree>
@@ -13108,7 +13481,7 @@
 </p:sld>
 </file>
 
-<file path=ppt/slides/slide18.xml><?xml version="1.0" encoding="utf-8"?>
+<file path=ppt/slides/slide19.xml><?xml version="1.0" encoding="utf-8"?>
 <p:sld xmlns:a="http://schemas.openxmlformats.org/drawingml/2006/main" xmlns:r="http://schemas.openxmlformats.org/officeDocument/2006/relationships" xmlns:p="http://schemas.openxmlformats.org/presentationml/2006/main">
   <p:cSld>
     <p:spTree>
@@ -13306,13 +13679,7 @@
           <a:p>
             <a:r>
               <a:rPr lang="en-US" dirty="0"/>
-              <a:t>Andrew Hall</a:t>
-            </a:r>
-          </a:p>
-          <a:p>
-            <a:r>
-              <a:rPr lang="en-US" dirty="0"/>
-              <a:t>Paul Yuknewicz</a:t>
+              <a:t>Jose Barbosa</a:t>
             </a:r>
           </a:p>
         </p:txBody>
@@ -13682,6 +14049,252 @@
           <a:chExt cx="0" cy="0"/>
         </a:xfrm>
       </p:grpSpPr>
+      <p:pic>
+        <p:nvPicPr>
+          <p:cNvPr id="7" name="Picture 6">
+            <a:extLst>
+              <a:ext uri="{FF2B5EF4-FFF2-40B4-BE49-F238E27FC236}">
+                <a16:creationId xmlns:a16="http://schemas.microsoft.com/office/drawing/2014/main" id="{63743DAA-A6DF-431D-8D92-32D31D27F2AD}"/>
+              </a:ext>
+            </a:extLst>
+          </p:cNvPr>
+          <p:cNvPicPr>
+            <a:picLocks noChangeAspect="1"/>
+          </p:cNvPicPr>
+          <p:nvPr/>
+        </p:nvPicPr>
+        <p:blipFill>
+          <a:blip r:embed="rId2">
+            <a:extLst>
+              <a:ext uri="{28A0092B-C50C-407E-A947-70E740481C1C}">
+                <a14:useLocalDpi xmlns:a14="http://schemas.microsoft.com/office/drawing/2010/main" val="0"/>
+              </a:ext>
+            </a:extLst>
+          </a:blip>
+          <a:stretch>
+            <a:fillRect/>
+          </a:stretch>
+        </p:blipFill>
+        <p:spPr>
+          <a:xfrm>
+            <a:off x="0" y="0"/>
+            <a:ext cx="12192000" cy="4140200"/>
+          </a:xfrm>
+          <a:prstGeom prst="rect">
+            <a:avLst/>
+          </a:prstGeom>
+        </p:spPr>
+      </p:pic>
+      <p:pic>
+        <p:nvPicPr>
+          <p:cNvPr id="1026" name="Picture 2" descr="Image result for jetabroad thailand">
+            <a:extLst>
+              <a:ext uri="{FF2B5EF4-FFF2-40B4-BE49-F238E27FC236}">
+                <a16:creationId xmlns:a16="http://schemas.microsoft.com/office/drawing/2014/main" id="{702654EB-E140-44D3-93A0-4F3B74A155BA}"/>
+              </a:ext>
+            </a:extLst>
+          </p:cNvPr>
+          <p:cNvPicPr>
+            <a:picLocks noChangeAspect="1" noChangeArrowheads="1"/>
+          </p:cNvPicPr>
+          <p:nvPr/>
+        </p:nvPicPr>
+        <p:blipFill>
+          <a:blip r:embed="rId3">
+            <a:extLst>
+              <a:ext uri="{28A0092B-C50C-407E-A947-70E740481C1C}">
+                <a14:useLocalDpi xmlns:a14="http://schemas.microsoft.com/office/drawing/2010/main" val="0"/>
+              </a:ext>
+            </a:extLst>
+          </a:blip>
+          <a:srcRect/>
+          <a:stretch>
+            <a:fillRect/>
+          </a:stretch>
+        </p:blipFill>
+        <p:spPr bwMode="auto">
+          <a:xfrm>
+            <a:off x="0" y="4140200"/>
+            <a:ext cx="3232335" cy="2717800"/>
+          </a:xfrm>
+          <a:prstGeom prst="rect">
+            <a:avLst/>
+          </a:prstGeom>
+          <a:noFill/>
+          <a:extLst>
+            <a:ext uri="{909E8E84-426E-40DD-AFC4-6F175D3DCCD1}">
+              <a14:hiddenFill xmlns:a14="http://schemas.microsoft.com/office/drawing/2010/main">
+                <a:solidFill>
+                  <a:srgbClr val="FFFFFF"/>
+                </a:solidFill>
+              </a14:hiddenFill>
+            </a:ext>
+          </a:extLst>
+        </p:spPr>
+      </p:pic>
+      <p:pic>
+        <p:nvPicPr>
+          <p:cNvPr id="1028" name="Picture 4" descr="Image result for jetabroad thailand">
+            <a:extLst>
+              <a:ext uri="{FF2B5EF4-FFF2-40B4-BE49-F238E27FC236}">
+                <a16:creationId xmlns:a16="http://schemas.microsoft.com/office/drawing/2014/main" id="{F92A899A-B965-43AC-844E-F61096A5829C}"/>
+              </a:ext>
+            </a:extLst>
+          </p:cNvPr>
+          <p:cNvPicPr>
+            <a:picLocks noChangeAspect="1" noChangeArrowheads="1"/>
+          </p:cNvPicPr>
+          <p:nvPr/>
+        </p:nvPicPr>
+        <p:blipFill>
+          <a:blip r:embed="rId4">
+            <a:extLst>
+              <a:ext uri="{28A0092B-C50C-407E-A947-70E740481C1C}">
+                <a14:useLocalDpi xmlns:a14="http://schemas.microsoft.com/office/drawing/2010/main" val="0"/>
+              </a:ext>
+            </a:extLst>
+          </a:blip>
+          <a:srcRect/>
+          <a:stretch>
+            <a:fillRect/>
+          </a:stretch>
+        </p:blipFill>
+        <p:spPr bwMode="auto">
+          <a:xfrm>
+            <a:off x="3232335" y="4140200"/>
+            <a:ext cx="1923865" cy="2717841"/>
+          </a:xfrm>
+          <a:prstGeom prst="rect">
+            <a:avLst/>
+          </a:prstGeom>
+          <a:noFill/>
+          <a:extLst>
+            <a:ext uri="{909E8E84-426E-40DD-AFC4-6F175D3DCCD1}">
+              <a14:hiddenFill xmlns:a14="http://schemas.microsoft.com/office/drawing/2010/main">
+                <a:solidFill>
+                  <a:srgbClr val="FFFFFF"/>
+                </a:solidFill>
+              </a14:hiddenFill>
+            </a:ext>
+          </a:extLst>
+        </p:spPr>
+      </p:pic>
+      <p:pic>
+        <p:nvPicPr>
+          <p:cNvPr id="9" name="Picture 8">
+            <a:extLst>
+              <a:ext uri="{FF2B5EF4-FFF2-40B4-BE49-F238E27FC236}">
+                <a16:creationId xmlns:a16="http://schemas.microsoft.com/office/drawing/2014/main" id="{7F075314-53B5-444B-BE56-D2A175065824}"/>
+              </a:ext>
+            </a:extLst>
+          </p:cNvPr>
+          <p:cNvPicPr>
+            <a:picLocks noChangeAspect="1"/>
+          </p:cNvPicPr>
+          <p:nvPr/>
+        </p:nvPicPr>
+        <p:blipFill>
+          <a:blip r:embed="rId5">
+            <a:extLst>
+              <a:ext uri="{28A0092B-C50C-407E-A947-70E740481C1C}">
+                <a14:useLocalDpi xmlns:a14="http://schemas.microsoft.com/office/drawing/2010/main" val="0"/>
+              </a:ext>
+            </a:extLst>
+          </a:blip>
+          <a:stretch>
+            <a:fillRect/>
+          </a:stretch>
+        </p:blipFill>
+        <p:spPr>
+          <a:xfrm>
+            <a:off x="5156200" y="4140200"/>
+            <a:ext cx="2717800" cy="2717800"/>
+          </a:xfrm>
+          <a:prstGeom prst="rect">
+            <a:avLst/>
+          </a:prstGeom>
+        </p:spPr>
+      </p:pic>
+      <p:pic>
+        <p:nvPicPr>
+          <p:cNvPr id="1030" name="Picture 6" descr="Image result for jetabroad">
+            <a:extLst>
+              <a:ext uri="{FF2B5EF4-FFF2-40B4-BE49-F238E27FC236}">
+                <a16:creationId xmlns:a16="http://schemas.microsoft.com/office/drawing/2014/main" id="{DF100EBB-AE4A-4CC1-BB33-82DEA599EBEF}"/>
+              </a:ext>
+            </a:extLst>
+          </p:cNvPr>
+          <p:cNvPicPr>
+            <a:picLocks noChangeAspect="1" noChangeArrowheads="1"/>
+          </p:cNvPicPr>
+          <p:nvPr/>
+        </p:nvPicPr>
+        <p:blipFill>
+          <a:blip r:embed="rId6">
+            <a:extLst>
+              <a:ext uri="{28A0092B-C50C-407E-A947-70E740481C1C}">
+                <a14:useLocalDpi xmlns:a14="http://schemas.microsoft.com/office/drawing/2010/main" val="0"/>
+              </a:ext>
+            </a:extLst>
+          </a:blip>
+          <a:srcRect/>
+          <a:stretch>
+            <a:fillRect/>
+          </a:stretch>
+        </p:blipFill>
+        <p:spPr bwMode="auto">
+          <a:xfrm>
+            <a:off x="8388535" y="4519612"/>
+            <a:ext cx="3022038" cy="923925"/>
+          </a:xfrm>
+          <a:prstGeom prst="rect">
+            <a:avLst/>
+          </a:prstGeom>
+          <a:noFill/>
+          <a:extLst>
+            <a:ext uri="{909E8E84-426E-40DD-AFC4-6F175D3DCCD1}">
+              <a14:hiddenFill xmlns:a14="http://schemas.microsoft.com/office/drawing/2010/main">
+                <a:solidFill>
+                  <a:srgbClr val="FFFFFF"/>
+                </a:solidFill>
+              </a14:hiddenFill>
+            </a:ext>
+          </a:extLst>
+        </p:spPr>
+      </p:pic>
+    </p:spTree>
+    <p:extLst>
+      <p:ext uri="{BB962C8B-B14F-4D97-AF65-F5344CB8AC3E}">
+        <p14:creationId xmlns:p14="http://schemas.microsoft.com/office/powerpoint/2010/main" val="613943695"/>
+      </p:ext>
+    </p:extLst>
+  </p:cSld>
+  <p:clrMapOvr>
+    <a:masterClrMapping/>
+  </p:clrMapOvr>
+  <p:transition>
+    <p:fade/>
+  </p:transition>
+</p:sld>
+</file>
+
+<file path=ppt/slides/slide5.xml><?xml version="1.0" encoding="utf-8"?>
+<p:sld xmlns:a="http://schemas.openxmlformats.org/drawingml/2006/main" xmlns:r="http://schemas.openxmlformats.org/officeDocument/2006/relationships" xmlns:p="http://schemas.openxmlformats.org/presentationml/2006/main">
+  <p:cSld>
+    <p:spTree>
+      <p:nvGrpSpPr>
+        <p:cNvPr id="1" name=""/>
+        <p:cNvGrpSpPr/>
+        <p:nvPr/>
+      </p:nvGrpSpPr>
+      <p:grpSpPr>
+        <a:xfrm>
+          <a:off x="0" y="0"/>
+          <a:ext cx="0" cy="0"/>
+          <a:chOff x="0" y="0"/>
+          <a:chExt cx="0" cy="0"/>
+        </a:xfrm>
+      </p:grpSpPr>
       <p:sp>
         <p:nvSpPr>
           <p:cNvPr id="2" name="Text Placeholder 1">
@@ -13913,7 +14526,7 @@
 </p:sld>
 </file>
 
-<file path=ppt/slides/slide5.xml><?xml version="1.0" encoding="utf-8"?>
+<file path=ppt/slides/slide6.xml><?xml version="1.0" encoding="utf-8"?>
 <p:sld xmlns:a="http://schemas.openxmlformats.org/drawingml/2006/main" xmlns:r="http://schemas.openxmlformats.org/officeDocument/2006/relationships" xmlns:p="http://schemas.openxmlformats.org/presentationml/2006/main">
   <p:cSld>
     <p:spTree>
@@ -14217,7 +14830,7 @@
 </p:sld>
 </file>
 
-<file path=ppt/slides/slide6.xml><?xml version="1.0" encoding="utf-8"?>
+<file path=ppt/slides/slide7.xml><?xml version="1.0" encoding="utf-8"?>
 <p:sld xmlns:a="http://schemas.openxmlformats.org/drawingml/2006/main" xmlns:r="http://schemas.openxmlformats.org/officeDocument/2006/relationships" xmlns:p="http://schemas.openxmlformats.org/presentationml/2006/main">
   <p:cSld>
     <p:spTree>
@@ -14817,7 +15430,7 @@
 </p:sld>
 </file>
 
-<file path=ppt/slides/slide7.xml><?xml version="1.0" encoding="utf-8"?>
+<file path=ppt/slides/slide8.xml><?xml version="1.0" encoding="utf-8"?>
 <p:sld xmlns:a="http://schemas.openxmlformats.org/drawingml/2006/main" xmlns:r="http://schemas.openxmlformats.org/officeDocument/2006/relationships" xmlns:p="http://schemas.openxmlformats.org/presentationml/2006/main">
   <p:cSld>
     <p:spTree>
@@ -14899,7 +15512,7 @@
 </p:sld>
 </file>
 
-<file path=ppt/slides/slide8.xml><?xml version="1.0" encoding="utf-8"?>
+<file path=ppt/slides/slide9.xml><?xml version="1.0" encoding="utf-8"?>
 <p:sld xmlns:a="http://schemas.openxmlformats.org/drawingml/2006/main" xmlns:r="http://schemas.openxmlformats.org/officeDocument/2006/relationships" xmlns:p="http://schemas.openxmlformats.org/presentationml/2006/main">
   <p:cSld>
     <p:spTree>
@@ -15275,378 +15888,6 @@
                                           <p:spTgt spid="3">
                                             <p:txEl>
                                               <p:pRg st="5" end="5"/>
-                                            </p:txEl>
-                                          </p:spTgt>
-                                        </p:tgtEl>
-                                        <p:attrNameLst>
-                                          <p:attrName>style.visibility</p:attrName>
-                                        </p:attrNameLst>
-                                      </p:cBhvr>
-                                      <p:to>
-                                        <p:strVal val="visible"/>
-                                      </p:to>
-                                    </p:set>
-                                  </p:childTnLst>
-                                </p:cTn>
-                              </p:par>
-                            </p:childTnLst>
-                          </p:cTn>
-                        </p:par>
-                      </p:childTnLst>
-                    </p:cTn>
-                  </p:par>
-                </p:childTnLst>
-              </p:cTn>
-              <p:prevCondLst>
-                <p:cond evt="onPrev" delay="0">
-                  <p:tgtEl>
-                    <p:sldTgt/>
-                  </p:tgtEl>
-                </p:cond>
-              </p:prevCondLst>
-              <p:nextCondLst>
-                <p:cond evt="onNext" delay="0">
-                  <p:tgtEl>
-                    <p:sldTgt/>
-                  </p:tgtEl>
-                </p:cond>
-              </p:nextCondLst>
-            </p:seq>
-          </p:childTnLst>
-        </p:cTn>
-      </p:par>
-    </p:tnLst>
-  </p:timing>
-</p:sld>
-</file>
-
-<file path=ppt/slides/slide9.xml><?xml version="1.0" encoding="utf-8"?>
-<p:sld xmlns:a="http://schemas.openxmlformats.org/drawingml/2006/main" xmlns:r="http://schemas.openxmlformats.org/officeDocument/2006/relationships" xmlns:p="http://schemas.openxmlformats.org/presentationml/2006/main">
-  <p:cSld>
-    <p:spTree>
-      <p:nvGrpSpPr>
-        <p:cNvPr id="1" name=""/>
-        <p:cNvGrpSpPr/>
-        <p:nvPr/>
-      </p:nvGrpSpPr>
-      <p:grpSpPr>
-        <a:xfrm>
-          <a:off x="0" y="0"/>
-          <a:ext cx="0" cy="0"/>
-          <a:chOff x="0" y="0"/>
-          <a:chExt cx="0" cy="0"/>
-        </a:xfrm>
-      </p:grpSpPr>
-      <p:sp>
-        <p:nvSpPr>
-          <p:cNvPr id="2" name="Title 1">
-            <a:extLst>
-              <a:ext uri="{FF2B5EF4-FFF2-40B4-BE49-F238E27FC236}">
-                <a16:creationId xmlns:a16="http://schemas.microsoft.com/office/drawing/2014/main" id="{1ED63F98-95E6-4879-8713-FDAE1CF8B348}"/>
-              </a:ext>
-            </a:extLst>
-          </p:cNvPr>
-          <p:cNvSpPr>
-            <a:spLocks noGrp="1"/>
-          </p:cNvSpPr>
-          <p:nvPr>
-            <p:ph type="title"/>
-          </p:nvPr>
-        </p:nvSpPr>
-        <p:spPr/>
-        <p:txBody>
-          <a:bodyPr/>
-          <a:lstStyle/>
-          <a:p>
-            <a:r>
-              <a:rPr lang="en-US" dirty="0"/>
-              <a:t>#2 SQL Database</a:t>
-            </a:r>
-          </a:p>
-        </p:txBody>
-      </p:sp>
-      <p:sp>
-        <p:nvSpPr>
-          <p:cNvPr id="3" name="Text Placeholder 2">
-            <a:extLst>
-              <a:ext uri="{FF2B5EF4-FFF2-40B4-BE49-F238E27FC236}">
-                <a16:creationId xmlns:a16="http://schemas.microsoft.com/office/drawing/2014/main" id="{593F4C24-F7F9-4FF1-9A5C-8DC692A69D8E}"/>
-              </a:ext>
-            </a:extLst>
-          </p:cNvPr>
-          <p:cNvSpPr>
-            <a:spLocks noGrp="1"/>
-          </p:cNvSpPr>
-          <p:nvPr>
-            <p:ph type="body" sz="quarter" idx="10"/>
-          </p:nvPr>
-        </p:nvSpPr>
-        <p:spPr>
-          <a:xfrm>
-            <a:off x="586389" y="1434370"/>
-            <a:ext cx="11166803" cy="2794611"/>
-          </a:xfrm>
-        </p:spPr>
-        <p:txBody>
-          <a:bodyPr/>
-          <a:lstStyle/>
-          <a:p>
-            <a:r>
-              <a:rPr lang="en-US" sz="3200" dirty="0">
-                <a:latin typeface="Segoe UI Semilight" panose="020B0402040204020203" pitchFamily="34" charset="0"/>
-                <a:cs typeface="Segoe UI Semilight" panose="020B0402040204020203" pitchFamily="34" charset="0"/>
-              </a:rPr>
-              <a:t>Built from the same code as SQL Server</a:t>
-            </a:r>
-          </a:p>
-          <a:p>
-            <a:r>
-              <a:rPr lang="en-US" sz="3200" dirty="0">
-                <a:latin typeface="Segoe UI Semilight" panose="020B0402040204020203" pitchFamily="34" charset="0"/>
-                <a:cs typeface="Segoe UI Semilight" panose="020B0402040204020203" pitchFamily="34" charset="0"/>
-              </a:rPr>
-              <a:t>	Updates available in Azure before SQL Server</a:t>
-            </a:r>
-          </a:p>
-          <a:p>
-            <a:r>
-              <a:rPr lang="en-US" sz="3200" dirty="0">
-                <a:latin typeface="Segoe UI Semilight" panose="020B0402040204020203" pitchFamily="34" charset="0"/>
-                <a:cs typeface="Segoe UI Semilight" panose="020B0402040204020203" pitchFamily="34" charset="0"/>
-              </a:rPr>
-              <a:t>Managed: Automatic patching, high availability, and scalability</a:t>
-            </a:r>
-          </a:p>
-          <a:p>
-            <a:r>
-              <a:rPr lang="en-US" sz="3200" dirty="0">
-                <a:latin typeface="Segoe UI Semilight" panose="020B0402040204020203" pitchFamily="34" charset="0"/>
-                <a:cs typeface="Segoe UI Semilight" panose="020B0402040204020203" pitchFamily="34" charset="0"/>
-              </a:rPr>
-              <a:t>Extensive monitoring and alerting capabilities</a:t>
-            </a:r>
-          </a:p>
-          <a:p>
-            <a:r>
-              <a:rPr lang="en-US" sz="3200" dirty="0">
-                <a:latin typeface="Segoe UI Semilight" panose="020B0402040204020203" pitchFamily="34" charset="0"/>
-                <a:cs typeface="Segoe UI Semilight" panose="020B0402040204020203" pitchFamily="34" charset="0"/>
-              </a:rPr>
-              <a:t>Integration with Visual Studio</a:t>
-            </a:r>
-          </a:p>
-        </p:txBody>
-      </p:sp>
-    </p:spTree>
-    <p:extLst>
-      <p:ext uri="{BB962C8B-B14F-4D97-AF65-F5344CB8AC3E}">
-        <p14:creationId xmlns:p14="http://schemas.microsoft.com/office/powerpoint/2010/main" val="1313076577"/>
-      </p:ext>
-    </p:extLst>
-  </p:cSld>
-  <p:clrMapOvr>
-    <a:masterClrMapping/>
-  </p:clrMapOvr>
-  <p:transition>
-    <p:fade/>
-  </p:transition>
-  <p:timing>
-    <p:tnLst>
-      <p:par>
-        <p:cTn id="1" dur="indefinite" restart="never" nodeType="tmRoot">
-          <p:childTnLst>
-            <p:seq concurrent="1" nextAc="seek">
-              <p:cTn id="2" dur="indefinite" nodeType="mainSeq">
-                <p:childTnLst>
-                  <p:par>
-                    <p:cTn id="3" fill="hold">
-                      <p:stCondLst>
-                        <p:cond delay="indefinite"/>
-                      </p:stCondLst>
-                      <p:childTnLst>
-                        <p:par>
-                          <p:cTn id="4" fill="hold">
-                            <p:stCondLst>
-                              <p:cond delay="0"/>
-                            </p:stCondLst>
-                            <p:childTnLst>
-                              <p:par>
-                                <p:cTn id="5" presetID="1" presetClass="entr" presetSubtype="0" fill="hold" nodeType="clickEffect">
-                                  <p:stCondLst>
-                                    <p:cond delay="0"/>
-                                  </p:stCondLst>
-                                  <p:childTnLst>
-                                    <p:set>
-                                      <p:cBhvr>
-                                        <p:cTn id="6" dur="1" fill="hold">
-                                          <p:stCondLst>
-                                            <p:cond delay="0"/>
-                                          </p:stCondLst>
-                                        </p:cTn>
-                                        <p:tgtEl>
-                                          <p:spTgt spid="3">
-                                            <p:txEl>
-                                              <p:pRg st="0" end="0"/>
-                                            </p:txEl>
-                                          </p:spTgt>
-                                        </p:tgtEl>
-                                        <p:attrNameLst>
-                                          <p:attrName>style.visibility</p:attrName>
-                                        </p:attrNameLst>
-                                      </p:cBhvr>
-                                      <p:to>
-                                        <p:strVal val="visible"/>
-                                      </p:to>
-                                    </p:set>
-                                  </p:childTnLst>
-                                </p:cTn>
-                              </p:par>
-                            </p:childTnLst>
-                          </p:cTn>
-                        </p:par>
-                        <p:par>
-                          <p:cTn id="7" fill="hold">
-                            <p:stCondLst>
-                              <p:cond delay="0"/>
-                            </p:stCondLst>
-                            <p:childTnLst>
-                              <p:par>
-                                <p:cTn id="8" presetID="1" presetClass="entr" presetSubtype="0" fill="hold" nodeType="afterEffect">
-                                  <p:stCondLst>
-                                    <p:cond delay="500"/>
-                                  </p:stCondLst>
-                                  <p:childTnLst>
-                                    <p:set>
-                                      <p:cBhvr>
-                                        <p:cTn id="9" dur="1" fill="hold">
-                                          <p:stCondLst>
-                                            <p:cond delay="0"/>
-                                          </p:stCondLst>
-                                        </p:cTn>
-                                        <p:tgtEl>
-                                          <p:spTgt spid="3">
-                                            <p:txEl>
-                                              <p:pRg st="1" end="1"/>
-                                            </p:txEl>
-                                          </p:spTgt>
-                                        </p:tgtEl>
-                                        <p:attrNameLst>
-                                          <p:attrName>style.visibility</p:attrName>
-                                        </p:attrNameLst>
-                                      </p:cBhvr>
-                                      <p:to>
-                                        <p:strVal val="visible"/>
-                                      </p:to>
-                                    </p:set>
-                                  </p:childTnLst>
-                                </p:cTn>
-                              </p:par>
-                            </p:childTnLst>
-                          </p:cTn>
-                        </p:par>
-                        <p:par>
-                          <p:cTn id="10" fill="hold">
-                            <p:stCondLst>
-                              <p:cond delay="500"/>
-                            </p:stCondLst>
-                            <p:childTnLst>
-                              <p:par>
-                                <p:cTn id="11" presetID="1" presetClass="entr" presetSubtype="0" fill="hold" nodeType="afterEffect">
-                                  <p:stCondLst>
-                                    <p:cond delay="500"/>
-                                  </p:stCondLst>
-                                  <p:childTnLst>
-                                    <p:set>
-                                      <p:cBhvr>
-                                        <p:cTn id="12" dur="1" fill="hold">
-                                          <p:stCondLst>
-                                            <p:cond delay="0"/>
-                                          </p:stCondLst>
-                                        </p:cTn>
-                                        <p:tgtEl>
-                                          <p:spTgt spid="3">
-                                            <p:txEl>
-                                              <p:pRg st="2" end="2"/>
-                                            </p:txEl>
-                                          </p:spTgt>
-                                        </p:tgtEl>
-                                        <p:attrNameLst>
-                                          <p:attrName>style.visibility</p:attrName>
-                                        </p:attrNameLst>
-                                      </p:cBhvr>
-                                      <p:to>
-                                        <p:strVal val="visible"/>
-                                      </p:to>
-                                    </p:set>
-                                  </p:childTnLst>
-                                </p:cTn>
-                              </p:par>
-                            </p:childTnLst>
-                          </p:cTn>
-                        </p:par>
-                        <p:par>
-                          <p:cTn id="13" fill="hold">
-                            <p:stCondLst>
-                              <p:cond delay="1000"/>
-                            </p:stCondLst>
-                            <p:childTnLst>
-                              <p:par>
-                                <p:cTn id="14" presetID="1" presetClass="entr" presetSubtype="0" fill="hold" nodeType="afterEffect">
-                                  <p:stCondLst>
-                                    <p:cond delay="500"/>
-                                  </p:stCondLst>
-                                  <p:childTnLst>
-                                    <p:set>
-                                      <p:cBhvr>
-                                        <p:cTn id="15" dur="1" fill="hold">
-                                          <p:stCondLst>
-                                            <p:cond delay="0"/>
-                                          </p:stCondLst>
-                                        </p:cTn>
-                                        <p:tgtEl>
-                                          <p:spTgt spid="3">
-                                            <p:txEl>
-                                              <p:pRg st="3" end="3"/>
-                                            </p:txEl>
-                                          </p:spTgt>
-                                        </p:tgtEl>
-                                        <p:attrNameLst>
-                                          <p:attrName>style.visibility</p:attrName>
-                                        </p:attrNameLst>
-                                      </p:cBhvr>
-                                      <p:to>
-                                        <p:strVal val="visible"/>
-                                      </p:to>
-                                    </p:set>
-                                  </p:childTnLst>
-                                </p:cTn>
-                              </p:par>
-                            </p:childTnLst>
-                          </p:cTn>
-                        </p:par>
-                        <p:par>
-                          <p:cTn id="16" fill="hold">
-                            <p:stCondLst>
-                              <p:cond delay="1500"/>
-                            </p:stCondLst>
-                            <p:childTnLst>
-                              <p:par>
-                                <p:cTn id="17" presetID="1" presetClass="entr" presetSubtype="0" fill="hold" nodeType="afterEffect">
-                                  <p:stCondLst>
-                                    <p:cond delay="500"/>
-                                  </p:stCondLst>
-                                  <p:childTnLst>
-                                    <p:set>
-                                      <p:cBhvr>
-                                        <p:cTn id="18" dur="1" fill="hold">
-                                          <p:stCondLst>
-                                            <p:cond delay="0"/>
-                                          </p:stCondLst>
-                                        </p:cTn>
-                                        <p:tgtEl>
-                                          <p:spTgt spid="3">
-                                            <p:txEl>
-                                              <p:pRg st="4" end="4"/>
                                             </p:txEl>
                                           </p:spTgt>
                                         </p:tgtEl>

</xml_diff>